<commit_message>
Update by UDP complete
ก่อนนอน
</commit_message>
<xml_diff>
--- a/Documents/LoRaIOTGoogleCoudPlatform.pptx
+++ b/Documents/LoRaIOTGoogleCoudPlatform.pptx
@@ -34,6 +34,8 @@
     <p:sldId id="284" r:id="rId28"/>
     <p:sldId id="285" r:id="rId29"/>
     <p:sldId id="286" r:id="rId30"/>
+    <p:sldId id="287" r:id="rId31"/>
+    <p:sldId id="288" r:id="rId32"/>
   </p:sldIdLst>
   <p:sldSz cx="12192000" cy="6858000"/>
   <p:notesSz cx="6858000" cy="9144000"/>
@@ -3087,11 +3089,7 @@
             <a:pPr algn="r"/>
             <a:r>
               <a:rPr lang="en-US" dirty="0" smtClean="0"/>
-              <a:t>Akarawat </a:t>
-            </a:r>
-            <a:r>
-              <a:rPr lang="en-US" dirty="0" smtClean="0"/>
-              <a:t>Panwilai</a:t>
+              <a:t>Akarawat Panwilai</a:t>
             </a:r>
             <a:r>
               <a:rPr lang="en-US" dirty="0"/>
@@ -4387,29 +4385,13 @@
           <a:p>
             <a:r>
               <a:rPr lang="en-US" dirty="0"/>
-              <a:t>$ </a:t>
-            </a:r>
-            <a:r>
-              <a:rPr lang="en-US" dirty="0" err="1"/>
-              <a:t>sudo</a:t>
-            </a:r>
+              <a:t>$ sudo apt-get update</a:t>
+            </a:r>
+          </a:p>
+          <a:p>
             <a:r>
               <a:rPr lang="en-US" dirty="0"/>
-              <a:t> apt-get update</a:t>
-            </a:r>
-          </a:p>
-          <a:p>
-            <a:r>
-              <a:rPr lang="en-US" dirty="0"/>
-              <a:t>$ </a:t>
-            </a:r>
-            <a:r>
-              <a:rPr lang="en-US" dirty="0" err="1"/>
-              <a:t>sudo</a:t>
-            </a:r>
-            <a:r>
-              <a:rPr lang="en-US" dirty="0"/>
-              <a:t> apt-get install </a:t>
+              <a:t>$ sudo apt-get install </a:t>
             </a:r>
             <a:r>
               <a:rPr lang="en-US" dirty="0" smtClean="0"/>
@@ -4419,15 +4401,7 @@
           <a:p>
             <a:r>
               <a:rPr lang="en-US" dirty="0"/>
-              <a:t>$ </a:t>
-            </a:r>
-            <a:r>
-              <a:rPr lang="en-US" dirty="0" err="1"/>
-              <a:t>sudo</a:t>
-            </a:r>
-            <a:r>
-              <a:rPr lang="en-US" dirty="0"/>
-              <a:t> </a:t>
+              <a:t>$ sudo </a:t>
             </a:r>
             <a:r>
               <a:rPr lang="en-US" dirty="0" err="1"/>
@@ -4437,7 +4411,6 @@
               <a:rPr lang="en-US" dirty="0"/>
               <a:t> start apache2</a:t>
             </a:r>
-            <a:endParaRPr lang="en-US" dirty="0"/>
           </a:p>
         </p:txBody>
       </p:sp>
@@ -4926,7 +4899,6 @@
               <a:rPr lang="en-US" dirty="0"/>
               <a:t>/www/html/index.html</a:t>
             </a:r>
-            <a:endParaRPr lang="en-US" dirty="0"/>
           </a:p>
         </p:txBody>
       </p:sp>
@@ -5642,15 +5614,33 @@
                         </a:spcAft>
                       </a:pPr>
                       <a:r>
-                        <a:rPr lang="en-US" sz="2400">
+                        <a:rPr lang="en-US" sz="2400" dirty="0">
                           <a:solidFill>
                             <a:schemeClr val="tx1"/>
                           </a:solidFill>
                           <a:effectLst/>
                         </a:rPr>
-                        <a:t>sudo mkdir foo </a:t>
+                        <a:t>sudo </a:t>
                       </a:r>
-                      <a:endParaRPr lang="en-US" sz="1800">
+                      <a:r>
+                        <a:rPr lang="en-US" sz="2400" dirty="0" err="1">
+                          <a:solidFill>
+                            <a:schemeClr val="tx1"/>
+                          </a:solidFill>
+                          <a:effectLst/>
+                        </a:rPr>
+                        <a:t>mkdir</a:t>
+                      </a:r>
+                      <a:r>
+                        <a:rPr lang="en-US" sz="2400" dirty="0">
+                          <a:solidFill>
+                            <a:schemeClr val="tx1"/>
+                          </a:solidFill>
+                          <a:effectLst/>
+                        </a:rPr>
+                        <a:t> foo </a:t>
+                      </a:r>
+                      <a:endParaRPr lang="en-US" sz="1800" dirty="0">
                         <a:solidFill>
                           <a:schemeClr val="tx1"/>
                         </a:solidFill>
@@ -5756,15 +5746,33 @@
                         </a:spcAft>
                       </a:pPr>
                       <a:r>
-                        <a:rPr lang="en-US" sz="2400">
+                        <a:rPr lang="en-US" sz="2400" dirty="0">
                           <a:solidFill>
                             <a:schemeClr val="tx1"/>
                           </a:solidFill>
                           <a:effectLst/>
                         </a:rPr>
-                        <a:t>sudo rm foo</a:t>
+                        <a:t>sudo </a:t>
                       </a:r>
-                      <a:endParaRPr lang="en-US" sz="1800">
+                      <a:r>
+                        <a:rPr lang="en-US" sz="2400" dirty="0" err="1">
+                          <a:solidFill>
+                            <a:schemeClr val="tx1"/>
+                          </a:solidFill>
+                          <a:effectLst/>
+                        </a:rPr>
+                        <a:t>rm</a:t>
+                      </a:r>
+                      <a:r>
+                        <a:rPr lang="en-US" sz="2400" dirty="0">
+                          <a:solidFill>
+                            <a:schemeClr val="tx1"/>
+                          </a:solidFill>
+                          <a:effectLst/>
+                        </a:rPr>
+                        <a:t> foo</a:t>
+                      </a:r>
+                      <a:endParaRPr lang="en-US" sz="1800" dirty="0">
                         <a:solidFill>
                           <a:schemeClr val="tx1"/>
                         </a:solidFill>
@@ -5852,15 +5860,51 @@
                         </a:spcAft>
                       </a:pPr>
                       <a:r>
-                        <a:rPr lang="en-US" sz="2400">
+                        <a:rPr lang="en-US" sz="2400" dirty="0">
                           <a:solidFill>
                             <a:schemeClr val="tx1"/>
                           </a:solidFill>
                           <a:effectLst/>
                         </a:rPr>
-                        <a:t>sudo rm -rf foo</a:t>
+                        <a:t>sudo </a:t>
                       </a:r>
-                      <a:endParaRPr lang="en-US" sz="1800">
+                      <a:r>
+                        <a:rPr lang="en-US" sz="2400" dirty="0" err="1">
+                          <a:solidFill>
+                            <a:schemeClr val="tx1"/>
+                          </a:solidFill>
+                          <a:effectLst/>
+                        </a:rPr>
+                        <a:t>rm</a:t>
+                      </a:r>
+                      <a:r>
+                        <a:rPr lang="en-US" sz="2400" dirty="0">
+                          <a:solidFill>
+                            <a:schemeClr val="tx1"/>
+                          </a:solidFill>
+                          <a:effectLst/>
+                        </a:rPr>
+                        <a:t> -</a:t>
+                      </a:r>
+                      <a:r>
+                        <a:rPr lang="en-US" sz="2400" dirty="0" err="1">
+                          <a:solidFill>
+                            <a:schemeClr val="tx1"/>
+                          </a:solidFill>
+                          <a:effectLst/>
+                        </a:rPr>
+                        <a:t>rf</a:t>
+                      </a:r>
+                      <a:r>
+                        <a:rPr lang="en-US" sz="2400" dirty="0">
+                          <a:solidFill>
+                            <a:schemeClr val="tx1"/>
+                          </a:solidFill>
+                          <a:effectLst/>
+                        </a:rPr>
+                        <a:t> foo</a:t>
+                      </a:r>
+                      <a:endParaRPr lang="en-US" sz="1800" dirty="0">
                         <a:solidFill>
                           <a:schemeClr val="tx1"/>
                         </a:solidFill>
@@ -5948,7 +5992,7 @@
                         </a:spcAft>
                       </a:pPr>
                       <a:r>
-                        <a:rPr lang="en-US" sz="2400">
+                        <a:rPr lang="en-US" sz="2400" dirty="0">
                           <a:solidFill>
                             <a:schemeClr val="tx1"/>
                           </a:solidFill>
@@ -5956,7 +6000,7 @@
                         </a:rPr>
                         <a:t>sudo unzip foo.zip</a:t>
                       </a:r>
-                      <a:endParaRPr lang="en-US" sz="1800">
+                      <a:endParaRPr lang="en-US" sz="1800" dirty="0">
                         <a:solidFill>
                           <a:schemeClr val="tx1"/>
                         </a:solidFill>
@@ -6629,19 +6673,7 @@
               <a:rPr lang="en-US" dirty="0">
                 <a:latin typeface="Tahoma" panose="020B0604030504040204" pitchFamily="34" charset="0"/>
               </a:rPr>
-              <a:t> https://deb.nodesource.com/setup_8.x | </a:t>
-            </a:r>
-            <a:r>
-              <a:rPr lang="en-US" dirty="0" err="1">
-                <a:latin typeface="Tahoma" panose="020B0604030504040204" pitchFamily="34" charset="0"/>
-              </a:rPr>
-              <a:t>sudo</a:t>
-            </a:r>
-            <a:r>
-              <a:rPr lang="en-US" dirty="0">
-                <a:latin typeface="Tahoma" panose="020B0604030504040204" pitchFamily="34" charset="0"/>
-              </a:rPr>
-              <a:t> -E bash -</a:t>
+              <a:t> https://deb.nodesource.com/setup_8.x | sudo -E bash -</a:t>
             </a:r>
             <a:br>
               <a:rPr lang="en-US" dirty="0">
@@ -6652,19 +6684,7 @@
               <a:rPr lang="en-US" dirty="0">
                 <a:latin typeface="Tahoma" panose="020B0604030504040204" pitchFamily="34" charset="0"/>
               </a:rPr>
-              <a:t>$ </a:t>
-            </a:r>
-            <a:r>
-              <a:rPr lang="en-US" dirty="0" err="1">
-                <a:latin typeface="Tahoma" panose="020B0604030504040204" pitchFamily="34" charset="0"/>
-              </a:rPr>
-              <a:t>sudo</a:t>
-            </a:r>
-            <a:r>
-              <a:rPr lang="en-US" dirty="0">
-                <a:latin typeface="Tahoma" panose="020B0604030504040204" pitchFamily="34" charset="0"/>
-              </a:rPr>
-              <a:t> apt-get install -y </a:t>
+              <a:t>$ sudo apt-get install -y </a:t>
             </a:r>
             <a:r>
               <a:rPr lang="en-US" dirty="0" err="1">
@@ -6691,11 +6711,7 @@
             </a:r>
             <a:r>
               <a:rPr lang="en-US" dirty="0"/>
-              <a:t>node -v</a:t>
-            </a:r>
-            <a:r>
-              <a:rPr lang="en-US" dirty="0"/>
-              <a:t> </a:t>
+              <a:t>node -v </a:t>
             </a:r>
           </a:p>
         </p:txBody>
@@ -6795,16 +6811,8 @@
               <a:t> </a:t>
             </a:r>
             <a:r>
-              <a:rPr lang="en-US" dirty="0" err="1"/>
-              <a:t>sudo</a:t>
-            </a:r>
-            <a:r>
               <a:rPr lang="en-US" dirty="0"/>
-              <a:t> apt-get install npm</a:t>
-            </a:r>
-            <a:r>
-              <a:rPr lang="en-US" dirty="0"/>
-              <a:t> </a:t>
+              <a:t>sudo apt-get install npm </a:t>
             </a:r>
             <a:br>
               <a:rPr lang="en-US" dirty="0"/>
@@ -6821,11 +6829,7 @@
             </a:r>
             <a:r>
               <a:rPr lang="en-US" dirty="0"/>
-              <a:t>-v</a:t>
-            </a:r>
-            <a:r>
-              <a:rPr lang="en-US" dirty="0"/>
-              <a:t> </a:t>
+              <a:t>-v </a:t>
             </a:r>
           </a:p>
         </p:txBody>
@@ -6999,12 +7003,8 @@
               <a:t>$ </a:t>
             </a:r>
             <a:r>
-              <a:rPr lang="en-US" dirty="0" err="1"/>
-              <a:t>sudo</a:t>
-            </a:r>
-            <a:r>
               <a:rPr lang="en-US" dirty="0"/>
-              <a:t> apt-get install </a:t>
+              <a:t>sudo apt-get install </a:t>
             </a:r>
             <a:r>
               <a:rPr lang="en-US" dirty="0" err="1" smtClean="0"/>
@@ -7129,12 +7129,8 @@
               <a:t> </a:t>
             </a:r>
             <a:r>
-              <a:rPr lang="en-US" dirty="0" err="1"/>
-              <a:t>sudo</a:t>
-            </a:r>
-            <a:r>
               <a:rPr lang="en-US" dirty="0"/>
-              <a:t> </a:t>
+              <a:t>sudo </a:t>
             </a:r>
             <a:r>
               <a:rPr lang="en-US" dirty="0" err="1"/>
@@ -7949,23 +7945,7 @@
                 <a:ea typeface="Tahoma" panose="020B0604030504040204" pitchFamily="34" charset="0"/>
                 <a:cs typeface="Tahoma" panose="020B0604030504040204" pitchFamily="34" charset="0"/>
               </a:rPr>
-              <a:t>LoRa </a:t>
-            </a:r>
-            <a:r>
-              <a:rPr lang="en-US" b="1" dirty="0" smtClean="0">
-                <a:solidFill>
-                  <a:srgbClr val="000000"/>
-                </a:solidFill>
-                <a:uFill>
-                  <a:solidFill>
-                    <a:srgbClr val="000000"/>
-                  </a:solidFill>
-                </a:uFill>
-                <a:latin typeface="Tahoma" panose="020B0604030504040204" pitchFamily="34" charset="0"/>
-                <a:ea typeface="Tahoma" panose="020B0604030504040204" pitchFamily="34" charset="0"/>
-                <a:cs typeface="Tahoma" panose="020B0604030504040204" pitchFamily="34" charset="0"/>
-              </a:rPr>
-              <a:t>Module</a:t>
+              <a:t>LoRa Module</a:t>
             </a:r>
             <a:r>
               <a:rPr lang="th-TH" b="1" dirty="0" smtClean="0">
@@ -8632,20 +8612,12 @@
               <a:t>$ </a:t>
             </a:r>
             <a:r>
-              <a:rPr lang="en-US" altLang="en-US" dirty="0" err="1">
+              <a:rPr lang="en-US" altLang="en-US" dirty="0">
                 <a:solidFill>
                   <a:srgbClr val="333333"/>
                 </a:solidFill>
               </a:rPr>
-              <a:t>sudo</a:t>
-            </a:r>
-            <a:r>
-              <a:rPr lang="en-US" altLang="en-US" dirty="0">
-                <a:solidFill>
-                  <a:srgbClr val="333333"/>
-                </a:solidFill>
-              </a:rPr>
-              <a:t> apt-get install zip</a:t>
+              <a:t>sudo apt-get install zip</a:t>
             </a:r>
             <a:r>
               <a:rPr lang="en-US" dirty="0"/>
@@ -8659,20 +8631,12 @@
               <a:t>$ </a:t>
             </a:r>
             <a:r>
-              <a:rPr lang="en-US" altLang="en-US" dirty="0" err="1">
+              <a:rPr lang="en-US" altLang="en-US" dirty="0">
                 <a:solidFill>
                   <a:srgbClr val="333333"/>
                 </a:solidFill>
               </a:rPr>
-              <a:t>sudo</a:t>
-            </a:r>
-            <a:r>
-              <a:rPr lang="en-US" altLang="en-US" dirty="0">
-                <a:solidFill>
-                  <a:srgbClr val="333333"/>
-                </a:solidFill>
-              </a:rPr>
-              <a:t> apt-get install unzip</a:t>
+              <a:t>sudo apt-get install unzip</a:t>
             </a:r>
             <a:r>
               <a:rPr lang="en-US" altLang="en-US" dirty="0"/>
@@ -8683,28 +8647,20 @@
           <a:p>
             <a:r>
               <a:rPr lang="en-US" dirty="0"/>
-              <a:t>$ </a:t>
+              <a:t>$ sudo npm install forever -g</a:t>
+            </a:r>
+          </a:p>
+          <a:p>
+            <a:endParaRPr lang="en-US" dirty="0" smtClean="0"/>
+          </a:p>
+          <a:p>
+            <a:r>
+              <a:rPr lang="en-US" dirty="0"/>
+              <a:t>$ sudo </a:t>
             </a:r>
             <a:r>
               <a:rPr lang="en-US" dirty="0" err="1"/>
-              <a:t>sudo</a:t>
-            </a:r>
-            <a:r>
-              <a:rPr lang="en-US" dirty="0"/>
-              <a:t> npm install forever -g</a:t>
-            </a:r>
-          </a:p>
-          <a:p>
-            <a:endParaRPr lang="en-US" dirty="0" smtClean="0"/>
-          </a:p>
-          <a:p>
-            <a:r>
-              <a:rPr lang="en-US" dirty="0"/>
-              <a:t>$ </a:t>
-            </a:r>
-            <a:r>
-              <a:rPr lang="en-US" dirty="0" err="1"/>
-              <a:t>sudo</a:t>
+              <a:t>mkdir</a:t>
             </a:r>
             <a:r>
               <a:rPr lang="en-US" dirty="0"/>
@@ -8712,20 +8668,12 @@
             </a:r>
             <a:r>
               <a:rPr lang="en-US" dirty="0" err="1"/>
-              <a:t>mkdir</a:t>
+              <a:t>myprotocol</a:t>
             </a:r>
             <a:r>
               <a:rPr lang="en-US" dirty="0"/>
               <a:t> </a:t>
             </a:r>
-            <a:r>
-              <a:rPr lang="en-US" dirty="0" err="1"/>
-              <a:t>myprotocol</a:t>
-            </a:r>
-            <a:r>
-              <a:rPr lang="en-US" dirty="0"/>
-              <a:t> </a:t>
-            </a:r>
           </a:p>
           <a:p>
             <a:r>
@@ -8741,15 +8689,7 @@
           <a:p>
             <a:r>
               <a:rPr lang="en-US" dirty="0" smtClean="0"/>
-              <a:t>$ </a:t>
-            </a:r>
-            <a:r>
-              <a:rPr lang="en-US" dirty="0" err="1" smtClean="0"/>
-              <a:t>sudo</a:t>
-            </a:r>
-            <a:r>
-              <a:rPr lang="en-US" dirty="0" smtClean="0"/>
-              <a:t> npm </a:t>
+              <a:t>$ sudo npm </a:t>
             </a:r>
             <a:r>
               <a:rPr lang="en-US" dirty="0" err="1" smtClean="0"/>
@@ -8766,12 +8706,8 @@
               <a:t>$ </a:t>
             </a:r>
             <a:r>
-              <a:rPr lang="en-US" dirty="0" err="1"/>
-              <a:t>sudo</a:t>
-            </a:r>
-            <a:r>
               <a:rPr lang="en-US" dirty="0"/>
-              <a:t> npm install express --</a:t>
+              <a:t>sudo npm install express --</a:t>
             </a:r>
             <a:r>
               <a:rPr lang="en-US" dirty="0" smtClean="0"/>
@@ -8789,12 +8725,8 @@
               <a:t>$ </a:t>
             </a:r>
             <a:r>
-              <a:rPr lang="en-US" dirty="0" err="1" smtClean="0"/>
-              <a:t>sudo</a:t>
-            </a:r>
-            <a:r>
               <a:rPr lang="en-US" dirty="0" smtClean="0"/>
-              <a:t> </a:t>
+              <a:t>sudo </a:t>
             </a:r>
             <a:r>
               <a:rPr lang="en-US" dirty="0"/>
@@ -8807,12 +8739,8 @@
               <a:t>$ </a:t>
             </a:r>
             <a:r>
-              <a:rPr lang="en-US" dirty="0" err="1" smtClean="0"/>
-              <a:t>sudo</a:t>
-            </a:r>
-            <a:r>
               <a:rPr lang="en-US" dirty="0" smtClean="0"/>
-              <a:t> </a:t>
+              <a:t>sudo </a:t>
             </a:r>
             <a:r>
               <a:rPr lang="en-US" dirty="0"/>
@@ -8833,12 +8761,8 @@
               <a:t>$ </a:t>
             </a:r>
             <a:r>
-              <a:rPr lang="en-US" dirty="0" err="1" smtClean="0"/>
-              <a:t>sudo</a:t>
-            </a:r>
-            <a:r>
               <a:rPr lang="en-US" dirty="0" smtClean="0"/>
-              <a:t> </a:t>
+              <a:t>sudo </a:t>
             </a:r>
             <a:r>
               <a:rPr lang="en-US" dirty="0"/>
@@ -8852,15 +8776,7 @@
           <a:p>
             <a:r>
               <a:rPr lang="en-US" dirty="0" smtClean="0"/>
-              <a:t>$ </a:t>
-            </a:r>
-            <a:r>
-              <a:rPr lang="en-US" dirty="0" err="1" smtClean="0"/>
-              <a:t>sudo</a:t>
-            </a:r>
-            <a:r>
-              <a:rPr lang="en-US" dirty="0" smtClean="0"/>
-              <a:t> </a:t>
+              <a:t>$ sudo </a:t>
             </a:r>
             <a:r>
               <a:rPr lang="en-US" altLang="en-US" dirty="0">
@@ -9832,12 +9748,8 @@
               <a:t>ใช้คำสั่งย้ายไฟล์ด้วย </a:t>
             </a:r>
             <a:r>
-              <a:rPr lang="en-US" dirty="0" err="1" smtClean="0"/>
-              <a:t>sudo</a:t>
-            </a:r>
-            <a:r>
               <a:rPr lang="en-US" dirty="0" smtClean="0"/>
-              <a:t> mv app.js </a:t>
+              <a:t>sudo mv app.js </a:t>
             </a:r>
             <a:r>
               <a:rPr lang="en-US" dirty="0" err="1" smtClean="0"/>
@@ -10312,24 +10224,14 @@
               <a:t>จะต้องสั่งด้วย </a:t>
             </a:r>
             <a:r>
-              <a:rPr lang="en-US" sz="2000" dirty="0" err="1">
+              <a:rPr lang="en-US" sz="2000" dirty="0">
                 <a:solidFill>
                   <a:srgbClr val="C00000"/>
                 </a:solidFill>
                 <a:latin typeface="Tahoma" panose="020B0604030504040204" pitchFamily="34" charset="0"/>
                 <a:ea typeface="Tahoma" panose="020B0604030504040204" pitchFamily="34" charset="0"/>
               </a:rPr>
-              <a:t>sudo</a:t>
-            </a:r>
-            <a:r>
-              <a:rPr lang="en-US" sz="2000" dirty="0">
-                <a:solidFill>
-                  <a:srgbClr val="C00000"/>
-                </a:solidFill>
-                <a:latin typeface="Tahoma" panose="020B0604030504040204" pitchFamily="34" charset="0"/>
-                <a:ea typeface="Tahoma" panose="020B0604030504040204" pitchFamily="34" charset="0"/>
-              </a:rPr>
-              <a:t> forever start app.js </a:t>
+              <a:t>sudo forever start app.js </a:t>
             </a:r>
             <a:endParaRPr lang="en-US" sz="1600" dirty="0">
               <a:solidFill>
@@ -10478,7 +10380,7 @@
         <p:spPr>
           <a:xfrm>
             <a:off x="914400" y="2366127"/>
-            <a:ext cx="9268858" cy="3139321"/>
+            <a:ext cx="9268858" cy="3416320"/>
           </a:xfrm>
           <a:prstGeom prst="rect">
             <a:avLst/>
@@ -10506,15 +10408,7 @@
           <a:p>
             <a:r>
               <a:rPr lang="en-US" dirty="0"/>
-              <a:t>$ </a:t>
-            </a:r>
-            <a:r>
-              <a:rPr lang="en-US" dirty="0" err="1"/>
-              <a:t>sudo</a:t>
-            </a:r>
-            <a:r>
-              <a:rPr lang="en-US" dirty="0"/>
-              <a:t> forever list</a:t>
+              <a:t>$ sudo forever list</a:t>
             </a:r>
           </a:p>
           <a:p>
@@ -10533,15 +10427,7 @@
           <a:p>
             <a:r>
               <a:rPr lang="en-US" dirty="0" smtClean="0"/>
-              <a:t>$ </a:t>
-            </a:r>
-            <a:r>
-              <a:rPr lang="en-US" dirty="0" err="1" smtClean="0"/>
-              <a:t>sudo</a:t>
-            </a:r>
-            <a:r>
-              <a:rPr lang="en-US" dirty="0" smtClean="0"/>
-              <a:t> forever start (</a:t>
+              <a:t>$ sudo forever start (</a:t>
             </a:r>
             <a:r>
               <a:rPr lang="th-TH" dirty="0" smtClean="0"/>
@@ -10572,15 +10458,7 @@
           <a:p>
             <a:r>
               <a:rPr lang="en-US" dirty="0"/>
-              <a:t>$ </a:t>
-            </a:r>
-            <a:r>
-              <a:rPr lang="en-US" dirty="0" err="1"/>
-              <a:t>sudo</a:t>
-            </a:r>
-            <a:r>
-              <a:rPr lang="en-US" dirty="0"/>
-              <a:t> forever </a:t>
+              <a:t>$ sudo forever </a:t>
             </a:r>
             <a:r>
               <a:rPr lang="en-US" dirty="0" smtClean="0"/>
@@ -10677,6 +10555,77 @@
                 </a:solidFill>
               </a:rPr>
               <a:t>ใหม่</a:t>
+            </a:r>
+            <a:endParaRPr lang="en-US" dirty="0" smtClean="0">
+              <a:solidFill>
+                <a:srgbClr val="C00000"/>
+              </a:solidFill>
+            </a:endParaRPr>
+          </a:p>
+          <a:p>
+            <a:r>
+              <a:rPr lang="en-US" dirty="0" smtClean="0">
+                <a:solidFill>
+                  <a:srgbClr val="C00000"/>
+                </a:solidFill>
+              </a:rPr>
+              <a:t>** </a:t>
+            </a:r>
+            <a:r>
+              <a:rPr lang="th-TH" dirty="0" smtClean="0">
+                <a:solidFill>
+                  <a:srgbClr val="C00000"/>
+                </a:solidFill>
+              </a:rPr>
+              <a:t>การสั่งงาน </a:t>
+            </a:r>
+            <a:r>
+              <a:rPr lang="en-US" dirty="0" smtClean="0">
+                <a:solidFill>
+                  <a:srgbClr val="C00000"/>
+                </a:solidFill>
+              </a:rPr>
+              <a:t>forever </a:t>
+            </a:r>
+            <a:r>
+              <a:rPr lang="th-TH" dirty="0" smtClean="0">
+                <a:solidFill>
+                  <a:srgbClr val="C00000"/>
+                </a:solidFill>
+              </a:rPr>
+              <a:t>ถ้าใช้ </a:t>
+            </a:r>
+            <a:r>
+              <a:rPr lang="en-US" dirty="0" smtClean="0">
+                <a:solidFill>
+                  <a:srgbClr val="C00000"/>
+                </a:solidFill>
+              </a:rPr>
+              <a:t>sudo </a:t>
+            </a:r>
+            <a:r>
+              <a:rPr lang="th-TH" dirty="0" smtClean="0">
+                <a:solidFill>
+                  <a:srgbClr val="C00000"/>
+                </a:solidFill>
+              </a:rPr>
+              <a:t>กับไม่ใช้มีผล ต่างกัน เนื่องจาก ระบบ จะมองว่าเป็นคนละ </a:t>
+            </a:r>
+            <a:r>
+              <a:rPr lang="en-US" dirty="0" smtClean="0">
+                <a:solidFill>
+                  <a:srgbClr val="C00000"/>
+                </a:solidFill>
+              </a:rPr>
+              <a:t>Transection </a:t>
+            </a:r>
+            <a:r>
+              <a:rPr lang="th-TH" dirty="0" smtClean="0">
+                <a:solidFill>
+                  <a:srgbClr val="C00000"/>
+                </a:solidFill>
+              </a:rPr>
+              <a:t>ดังนั้นควรระวังข้อนี้ด้วย</a:t>
             </a:r>
             <a:endParaRPr lang="en-US" dirty="0">
               <a:solidFill>
@@ -10759,24 +10708,14 @@
               <a:t>ทดสอบการติดต่อกับ </a:t>
             </a:r>
             <a:r>
-              <a:rPr lang="en-US" sz="2800" dirty="0" err="1" smtClean="0">
+              <a:rPr lang="en-US" sz="2800" dirty="0" smtClean="0">
                 <a:solidFill>
                   <a:srgbClr val="000000"/>
                 </a:solidFill>
                 <a:latin typeface="Tahoma" panose="020B0604030504040204" pitchFamily="34" charset="0"/>
                 <a:ea typeface="Tahoma" panose="020B0604030504040204" pitchFamily="34" charset="0"/>
               </a:rPr>
-              <a:t>Api</a:t>
-            </a:r>
-            <a:r>
-              <a:rPr lang="en-US" sz="2800" dirty="0" smtClean="0">
-                <a:solidFill>
-                  <a:srgbClr val="000000"/>
-                </a:solidFill>
-                <a:latin typeface="Tahoma" panose="020B0604030504040204" pitchFamily="34" charset="0"/>
-                <a:ea typeface="Tahoma" panose="020B0604030504040204" pitchFamily="34" charset="0"/>
-              </a:rPr>
-              <a:t> </a:t>
+              <a:t>Api </a:t>
             </a:r>
             <a:r>
               <a:rPr lang="th-TH" sz="2800" dirty="0" smtClean="0">
@@ -11044,24 +10983,14 @@
               <a:t>ทดสอบการติดต่อกับ </a:t>
             </a:r>
             <a:r>
-              <a:rPr lang="en-US" sz="2800" dirty="0" err="1" smtClean="0">
+              <a:rPr lang="en-US" sz="2800" dirty="0" smtClean="0">
                 <a:solidFill>
                   <a:srgbClr val="000000"/>
                 </a:solidFill>
                 <a:latin typeface="Tahoma" panose="020B0604030504040204" pitchFamily="34" charset="0"/>
                 <a:ea typeface="Tahoma" panose="020B0604030504040204" pitchFamily="34" charset="0"/>
               </a:rPr>
-              <a:t>Api</a:t>
-            </a:r>
-            <a:r>
-              <a:rPr lang="en-US" sz="2800" dirty="0" smtClean="0">
-                <a:solidFill>
-                  <a:srgbClr val="000000"/>
-                </a:solidFill>
-                <a:latin typeface="Tahoma" panose="020B0604030504040204" pitchFamily="34" charset="0"/>
-                <a:ea typeface="Tahoma" panose="020B0604030504040204" pitchFamily="34" charset="0"/>
-              </a:rPr>
-              <a:t> </a:t>
+              <a:t>Api </a:t>
             </a:r>
             <a:r>
               <a:rPr lang="th-TH" sz="2800" dirty="0" smtClean="0">
@@ -11459,24 +11388,14 @@
               <a:t>สร้าง การเชื่อมต่อกับ </a:t>
             </a:r>
             <a:r>
-              <a:rPr lang="en-US" sz="2800" dirty="0" err="1" smtClean="0">
+              <a:rPr lang="en-US" sz="2800" dirty="0" smtClean="0">
                 <a:solidFill>
                   <a:srgbClr val="000000"/>
                 </a:solidFill>
                 <a:latin typeface="Tahoma" panose="020B0604030504040204" pitchFamily="34" charset="0"/>
                 <a:ea typeface="Tahoma" panose="020B0604030504040204" pitchFamily="34" charset="0"/>
               </a:rPr>
-              <a:t>Api</a:t>
-            </a:r>
-            <a:r>
-              <a:rPr lang="en-US" sz="2800" dirty="0" smtClean="0">
-                <a:solidFill>
-                  <a:srgbClr val="000000"/>
-                </a:solidFill>
-                <a:latin typeface="Tahoma" panose="020B0604030504040204" pitchFamily="34" charset="0"/>
-                <a:ea typeface="Tahoma" panose="020B0604030504040204" pitchFamily="34" charset="0"/>
-              </a:rPr>
-              <a:t> </a:t>
+              <a:t>Api </a:t>
             </a:r>
             <a:r>
               <a:rPr lang="th-TH" sz="2800" dirty="0" smtClean="0">
@@ -11531,6 +11450,11 @@
           <a:prstGeom prst="rect">
             <a:avLst/>
           </a:prstGeom>
+          <a:ln>
+            <a:solidFill>
+              <a:srgbClr val="FF0000"/>
+            </a:solidFill>
+          </a:ln>
         </p:spPr>
       </p:pic>
       <p:pic>
@@ -11555,6 +11479,11 @@
           <a:prstGeom prst="rect">
             <a:avLst/>
           </a:prstGeom>
+          <a:ln>
+            <a:solidFill>
+              <a:srgbClr val="FF0000"/>
+            </a:solidFill>
+          </a:ln>
         </p:spPr>
       </p:pic>
       <p:sp>
@@ -11753,6 +11682,519 @@
     <p:extLst>
       <p:ext uri="{BB962C8B-B14F-4D97-AF65-F5344CB8AC3E}">
         <p14:creationId xmlns:p14="http://schemas.microsoft.com/office/powerpoint/2010/main" val="372130837"/>
+      </p:ext>
+    </p:extLst>
+  </p:cSld>
+  <p:clrMapOvr>
+    <a:masterClrMapping/>
+  </p:clrMapOvr>
+</p:sld>
+</file>
+
+<file path=ppt/slides/slide30.xml><?xml version="1.0" encoding="utf-8"?>
+<p:sld xmlns:a="http://schemas.openxmlformats.org/drawingml/2006/main" xmlns:r="http://schemas.openxmlformats.org/officeDocument/2006/relationships" xmlns:p="http://schemas.openxmlformats.org/presentationml/2006/main">
+  <p:cSld>
+    <p:spTree>
+      <p:nvGrpSpPr>
+        <p:cNvPr id="1" name=""/>
+        <p:cNvGrpSpPr/>
+        <p:nvPr/>
+      </p:nvGrpSpPr>
+      <p:grpSpPr>
+        <a:xfrm>
+          <a:off x="0" y="0"/>
+          <a:ext cx="0" cy="0"/>
+          <a:chOff x="0" y="0"/>
+          <a:chExt cx="0" cy="0"/>
+        </a:xfrm>
+      </p:grpSpPr>
+      <p:sp>
+        <p:nvSpPr>
+          <p:cNvPr id="2" name="Rectangle 476"/>
+          <p:cNvSpPr/>
+          <p:nvPr/>
+        </p:nvSpPr>
+        <p:spPr>
+          <a:xfrm>
+            <a:off x="914400" y="383731"/>
+            <a:ext cx="8496522" cy="328232"/>
+          </a:xfrm>
+          <a:prstGeom prst="rect">
+            <a:avLst/>
+          </a:prstGeom>
+          <a:ln>
+            <a:noFill/>
+          </a:ln>
+        </p:spPr>
+        <p:txBody>
+          <a:bodyPr vert="horz" lIns="0" tIns="0" rIns="0" bIns="0" rtlCol="0">
+            <a:noAutofit/>
+          </a:bodyPr>
+          <a:lstStyle/>
+          <a:p>
+            <a:pPr>
+              <a:lnSpc>
+                <a:spcPct val="107000"/>
+              </a:lnSpc>
+              <a:spcAft>
+                <a:spcPts val="800"/>
+              </a:spcAft>
+            </a:pPr>
+            <a:r>
+              <a:rPr lang="en-US" sz="2800" dirty="0" smtClean="0">
+                <a:solidFill>
+                  <a:srgbClr val="000000"/>
+                </a:solidFill>
+                <a:latin typeface="Tahoma" panose="020B0604030504040204" pitchFamily="34" charset="0"/>
+                <a:ea typeface="Tahoma" panose="020B0604030504040204" pitchFamily="34" charset="0"/>
+              </a:rPr>
+              <a:t>*** </a:t>
+            </a:r>
+            <a:r>
+              <a:rPr lang="th-TH" sz="2800" dirty="0" smtClean="0">
+                <a:solidFill>
+                  <a:srgbClr val="000000"/>
+                </a:solidFill>
+                <a:latin typeface="Tahoma" panose="020B0604030504040204" pitchFamily="34" charset="0"/>
+                <a:ea typeface="Tahoma" panose="020B0604030504040204" pitchFamily="34" charset="0"/>
+              </a:rPr>
+              <a:t>สร้าง การเชื่อมต่อกับ </a:t>
+            </a:r>
+            <a:r>
+              <a:rPr lang="en-US" sz="2800" dirty="0" smtClean="0">
+                <a:solidFill>
+                  <a:srgbClr val="000000"/>
+                </a:solidFill>
+                <a:latin typeface="Tahoma" panose="020B0604030504040204" pitchFamily="34" charset="0"/>
+                <a:ea typeface="Tahoma" panose="020B0604030504040204" pitchFamily="34" charset="0"/>
+              </a:rPr>
+              <a:t>Api </a:t>
+            </a:r>
+            <a:r>
+              <a:rPr lang="th-TH" sz="2800" dirty="0" smtClean="0">
+                <a:solidFill>
+                  <a:srgbClr val="000000"/>
+                </a:solidFill>
+                <a:latin typeface="Tahoma" panose="020B0604030504040204" pitchFamily="34" charset="0"/>
+                <a:ea typeface="Tahoma" panose="020B0604030504040204" pitchFamily="34" charset="0"/>
+              </a:rPr>
+              <a:t>ด้วย </a:t>
+            </a:r>
+            <a:r>
+              <a:rPr lang="en-US" sz="2800" dirty="0" smtClean="0">
+                <a:solidFill>
+                  <a:srgbClr val="000000"/>
+                </a:solidFill>
+                <a:latin typeface="Tahoma" panose="020B0604030504040204" pitchFamily="34" charset="0"/>
+                <a:ea typeface="Tahoma" panose="020B0604030504040204" pitchFamily="34" charset="0"/>
+              </a:rPr>
+              <a:t>UDP Service</a:t>
+            </a:r>
+            <a:endParaRPr lang="en-US" sz="2000" dirty="0">
+              <a:solidFill>
+                <a:srgbClr val="000000"/>
+              </a:solidFill>
+              <a:effectLst/>
+              <a:latin typeface="Calibri" panose="020F0502020204030204" pitchFamily="34" charset="0"/>
+              <a:ea typeface="Calibri" panose="020F0502020204030204" pitchFamily="34" charset="0"/>
+            </a:endParaRPr>
+          </a:p>
+        </p:txBody>
+      </p:sp>
+      <p:sp>
+        <p:nvSpPr>
+          <p:cNvPr id="10" name="สี่เหลี่ยมผืนผ้า 9"/>
+          <p:cNvSpPr/>
+          <p:nvPr/>
+        </p:nvSpPr>
+        <p:spPr>
+          <a:xfrm>
+            <a:off x="914400" y="914608"/>
+            <a:ext cx="9268858" cy="369332"/>
+          </a:xfrm>
+          <a:prstGeom prst="rect">
+            <a:avLst/>
+          </a:prstGeom>
+        </p:spPr>
+        <p:txBody>
+          <a:bodyPr wrap="square">
+            <a:spAutoFit/>
+          </a:bodyPr>
+          <a:lstStyle/>
+          <a:p>
+            <a:r>
+              <a:rPr lang="th-TH" dirty="0" smtClean="0"/>
+              <a:t>1. </a:t>
+            </a:r>
+            <a:r>
+              <a:rPr lang="en-US" dirty="0" smtClean="0"/>
+              <a:t>Upload file “udp.js” </a:t>
+            </a:r>
+            <a:r>
+              <a:rPr lang="th-TH" dirty="0" smtClean="0"/>
+              <a:t>ขึ้นระบบ และย้ายไปไว้ที่ </a:t>
+            </a:r>
+            <a:r>
+              <a:rPr lang="en-US" dirty="0"/>
+              <a:t>Folder </a:t>
+            </a:r>
+            <a:r>
+              <a:rPr lang="en-US" dirty="0" err="1"/>
+              <a:t>myprotocol</a:t>
+            </a:r>
+            <a:endParaRPr lang="en-US" dirty="0">
+              <a:solidFill>
+                <a:srgbClr val="C00000"/>
+              </a:solidFill>
+            </a:endParaRPr>
+          </a:p>
+        </p:txBody>
+      </p:sp>
+      <p:pic>
+        <p:nvPicPr>
+          <p:cNvPr id="5" name="รูปภาพ 4"/>
+          <p:cNvPicPr>
+            <a:picLocks noChangeAspect="1"/>
+          </p:cNvPicPr>
+          <p:nvPr/>
+        </p:nvPicPr>
+        <p:blipFill>
+          <a:blip r:embed="rId2"/>
+          <a:stretch>
+            <a:fillRect/>
+          </a:stretch>
+        </p:blipFill>
+        <p:spPr>
+          <a:xfrm>
+            <a:off x="914400" y="1283940"/>
+            <a:ext cx="4190683" cy="2843044"/>
+          </a:xfrm>
+          <a:prstGeom prst="rect">
+            <a:avLst/>
+          </a:prstGeom>
+        </p:spPr>
+      </p:pic>
+      <p:sp>
+        <p:nvSpPr>
+          <p:cNvPr id="9" name="ลูกศรขวา 8"/>
+          <p:cNvSpPr/>
+          <p:nvPr/>
+        </p:nvSpPr>
+        <p:spPr>
+          <a:xfrm rot="19451754">
+            <a:off x="1605548" y="2251693"/>
+            <a:ext cx="364598" cy="275422"/>
+          </a:xfrm>
+          <a:prstGeom prst="rightArrow">
+            <a:avLst/>
+          </a:prstGeom>
+          <a:solidFill>
+            <a:srgbClr val="00B050"/>
+          </a:solidFill>
+        </p:spPr>
+        <p:style>
+          <a:lnRef idx="2">
+            <a:schemeClr val="accent1">
+              <a:shade val="50000"/>
+            </a:schemeClr>
+          </a:lnRef>
+          <a:fillRef idx="1">
+            <a:schemeClr val="accent1"/>
+          </a:fillRef>
+          <a:effectRef idx="0">
+            <a:schemeClr val="accent1"/>
+          </a:effectRef>
+          <a:fontRef idx="minor">
+            <a:schemeClr val="lt1"/>
+          </a:fontRef>
+        </p:style>
+        <p:txBody>
+          <a:bodyPr rtlCol="0" anchor="ctr"/>
+          <a:lstStyle/>
+          <a:p>
+            <a:pPr algn="ctr"/>
+            <a:endParaRPr lang="en-US"/>
+          </a:p>
+        </p:txBody>
+      </p:sp>
+      <p:pic>
+        <p:nvPicPr>
+          <p:cNvPr id="7" name="รูปภาพ 6"/>
+          <p:cNvPicPr>
+            <a:picLocks noChangeAspect="1"/>
+          </p:cNvPicPr>
+          <p:nvPr/>
+        </p:nvPicPr>
+        <p:blipFill>
+          <a:blip r:embed="rId3"/>
+          <a:stretch>
+            <a:fillRect/>
+          </a:stretch>
+        </p:blipFill>
+        <p:spPr>
+          <a:xfrm>
+            <a:off x="5906188" y="1357997"/>
+            <a:ext cx="4610100" cy="257175"/>
+          </a:xfrm>
+          <a:prstGeom prst="rect">
+            <a:avLst/>
+          </a:prstGeom>
+        </p:spPr>
+      </p:pic>
+      <p:sp>
+        <p:nvSpPr>
+          <p:cNvPr id="12" name="สี่เหลี่ยมผืนผ้า 11"/>
+          <p:cNvSpPr/>
+          <p:nvPr/>
+        </p:nvSpPr>
+        <p:spPr>
+          <a:xfrm>
+            <a:off x="914400" y="4332608"/>
+            <a:ext cx="9268858" cy="923330"/>
+          </a:xfrm>
+          <a:prstGeom prst="rect">
+            <a:avLst/>
+          </a:prstGeom>
+        </p:spPr>
+        <p:txBody>
+          <a:bodyPr wrap="square">
+            <a:spAutoFit/>
+          </a:bodyPr>
+          <a:lstStyle/>
+          <a:p>
+            <a:r>
+              <a:rPr lang="th-TH" dirty="0" smtClean="0"/>
+              <a:t>2. สั่ง </a:t>
+            </a:r>
+            <a:r>
+              <a:rPr lang="en-US" dirty="0" smtClean="0"/>
+              <a:t>run script </a:t>
+            </a:r>
+            <a:r>
+              <a:rPr lang="th-TH" dirty="0" smtClean="0"/>
+              <a:t>ด้วยคำสั่ง </a:t>
+            </a:r>
+            <a:endParaRPr lang="en-US" dirty="0" smtClean="0"/>
+          </a:p>
+          <a:p>
+            <a:r>
+              <a:rPr lang="en-US" dirty="0" smtClean="0"/>
+              <a:t>$ node udp.js</a:t>
+            </a:r>
+          </a:p>
+          <a:p>
+            <a:r>
+              <a:rPr lang="th-TH" dirty="0"/>
+              <a:t>3. จะพบ คำสั่ง ที่เรากำหนดไว้ใน </a:t>
+            </a:r>
+            <a:r>
+              <a:rPr lang="en-US" dirty="0" smtClean="0"/>
+              <a:t>script</a:t>
+            </a:r>
+            <a:endParaRPr lang="en-US" dirty="0"/>
+          </a:p>
+        </p:txBody>
+      </p:sp>
+      <p:pic>
+        <p:nvPicPr>
+          <p:cNvPr id="8" name="รูปภาพ 7"/>
+          <p:cNvPicPr>
+            <a:picLocks noChangeAspect="1"/>
+          </p:cNvPicPr>
+          <p:nvPr/>
+        </p:nvPicPr>
+        <p:blipFill>
+          <a:blip r:embed="rId4"/>
+          <a:stretch>
+            <a:fillRect/>
+          </a:stretch>
+        </p:blipFill>
+        <p:spPr>
+          <a:xfrm>
+            <a:off x="914400" y="5508101"/>
+            <a:ext cx="4981575" cy="647700"/>
+          </a:xfrm>
+          <a:prstGeom prst="rect">
+            <a:avLst/>
+          </a:prstGeom>
+        </p:spPr>
+      </p:pic>
+    </p:spTree>
+    <p:extLst>
+      <p:ext uri="{BB962C8B-B14F-4D97-AF65-F5344CB8AC3E}">
+        <p14:creationId xmlns:p14="http://schemas.microsoft.com/office/powerpoint/2010/main" val="1524373252"/>
+      </p:ext>
+    </p:extLst>
+  </p:cSld>
+  <p:clrMapOvr>
+    <a:masterClrMapping/>
+  </p:clrMapOvr>
+</p:sld>
+</file>
+
+<file path=ppt/slides/slide31.xml><?xml version="1.0" encoding="utf-8"?>
+<p:sld xmlns:a="http://schemas.openxmlformats.org/drawingml/2006/main" xmlns:r="http://schemas.openxmlformats.org/officeDocument/2006/relationships" xmlns:p="http://schemas.openxmlformats.org/presentationml/2006/main">
+  <p:cSld>
+    <p:spTree>
+      <p:nvGrpSpPr>
+        <p:cNvPr id="1" name=""/>
+        <p:cNvGrpSpPr/>
+        <p:nvPr/>
+      </p:nvGrpSpPr>
+      <p:grpSpPr>
+        <a:xfrm>
+          <a:off x="0" y="0"/>
+          <a:ext cx="0" cy="0"/>
+          <a:chOff x="0" y="0"/>
+          <a:chExt cx="0" cy="0"/>
+        </a:xfrm>
+      </p:grpSpPr>
+      <p:sp>
+        <p:nvSpPr>
+          <p:cNvPr id="2" name="Rectangle 476"/>
+          <p:cNvSpPr/>
+          <p:nvPr/>
+        </p:nvSpPr>
+        <p:spPr>
+          <a:xfrm>
+            <a:off x="914400" y="383731"/>
+            <a:ext cx="8496522" cy="328232"/>
+          </a:xfrm>
+          <a:prstGeom prst="rect">
+            <a:avLst/>
+          </a:prstGeom>
+          <a:ln>
+            <a:noFill/>
+          </a:ln>
+        </p:spPr>
+        <p:txBody>
+          <a:bodyPr vert="horz" lIns="0" tIns="0" rIns="0" bIns="0" rtlCol="0">
+            <a:noAutofit/>
+          </a:bodyPr>
+          <a:lstStyle/>
+          <a:p>
+            <a:pPr>
+              <a:lnSpc>
+                <a:spcPct val="107000"/>
+              </a:lnSpc>
+              <a:spcAft>
+                <a:spcPts val="800"/>
+              </a:spcAft>
+            </a:pPr>
+            <a:r>
+              <a:rPr lang="en-US" sz="2800" dirty="0" smtClean="0">
+                <a:solidFill>
+                  <a:srgbClr val="000000"/>
+                </a:solidFill>
+                <a:latin typeface="Tahoma" panose="020B0604030504040204" pitchFamily="34" charset="0"/>
+                <a:ea typeface="Tahoma" panose="020B0604030504040204" pitchFamily="34" charset="0"/>
+              </a:rPr>
+              <a:t>*** </a:t>
+            </a:r>
+            <a:r>
+              <a:rPr lang="th-TH" sz="2800" dirty="0" smtClean="0">
+                <a:solidFill>
+                  <a:srgbClr val="000000"/>
+                </a:solidFill>
+                <a:latin typeface="Tahoma" panose="020B0604030504040204" pitchFamily="34" charset="0"/>
+                <a:ea typeface="Tahoma" panose="020B0604030504040204" pitchFamily="34" charset="0"/>
+              </a:rPr>
+              <a:t>สร้าง การเชื่อมต่อกับ </a:t>
+            </a:r>
+            <a:r>
+              <a:rPr lang="en-US" sz="2800" dirty="0" smtClean="0">
+                <a:solidFill>
+                  <a:srgbClr val="000000"/>
+                </a:solidFill>
+                <a:latin typeface="Tahoma" panose="020B0604030504040204" pitchFamily="34" charset="0"/>
+                <a:ea typeface="Tahoma" panose="020B0604030504040204" pitchFamily="34" charset="0"/>
+              </a:rPr>
+              <a:t>Api </a:t>
+            </a:r>
+            <a:r>
+              <a:rPr lang="th-TH" sz="2800" dirty="0" smtClean="0">
+                <a:solidFill>
+                  <a:srgbClr val="000000"/>
+                </a:solidFill>
+                <a:latin typeface="Tahoma" panose="020B0604030504040204" pitchFamily="34" charset="0"/>
+                <a:ea typeface="Tahoma" panose="020B0604030504040204" pitchFamily="34" charset="0"/>
+              </a:rPr>
+              <a:t>ด้วย </a:t>
+            </a:r>
+            <a:r>
+              <a:rPr lang="en-US" sz="2800" dirty="0" smtClean="0">
+                <a:solidFill>
+                  <a:srgbClr val="000000"/>
+                </a:solidFill>
+                <a:latin typeface="Tahoma" panose="020B0604030504040204" pitchFamily="34" charset="0"/>
+                <a:ea typeface="Tahoma" panose="020B0604030504040204" pitchFamily="34" charset="0"/>
+              </a:rPr>
+              <a:t>UDP Service</a:t>
+            </a:r>
+            <a:endParaRPr lang="en-US" sz="2000" dirty="0">
+              <a:solidFill>
+                <a:srgbClr val="000000"/>
+              </a:solidFill>
+              <a:effectLst/>
+              <a:latin typeface="Calibri" panose="020F0502020204030204" pitchFamily="34" charset="0"/>
+              <a:ea typeface="Calibri" panose="020F0502020204030204" pitchFamily="34" charset="0"/>
+            </a:endParaRPr>
+          </a:p>
+        </p:txBody>
+      </p:sp>
+      <p:sp>
+        <p:nvSpPr>
+          <p:cNvPr id="10" name="สี่เหลี่ยมผืนผ้า 9"/>
+          <p:cNvSpPr/>
+          <p:nvPr/>
+        </p:nvSpPr>
+        <p:spPr>
+          <a:xfrm>
+            <a:off x="914400" y="914608"/>
+            <a:ext cx="9268858" cy="369332"/>
+          </a:xfrm>
+          <a:prstGeom prst="rect">
+            <a:avLst/>
+          </a:prstGeom>
+        </p:spPr>
+        <p:txBody>
+          <a:bodyPr wrap="square">
+            <a:spAutoFit/>
+          </a:bodyPr>
+          <a:lstStyle/>
+          <a:p>
+            <a:r>
+              <a:rPr lang="th-TH" dirty="0" smtClean="0"/>
+              <a:t>1.</a:t>
+            </a:r>
+            <a:r>
+              <a:rPr lang="en-US" dirty="0" smtClean="0"/>
+              <a:t> </a:t>
+            </a:r>
+            <a:r>
+              <a:rPr lang="th-TH" dirty="0" smtClean="0"/>
+              <a:t>ทดสอบ การนำข้อมูลขึ้น </a:t>
+            </a:r>
+            <a:r>
+              <a:rPr lang="th-TH" dirty="0" smtClean="0"/>
+              <a:t>ระบบ ด้วยโปรแกรม เช่น </a:t>
+            </a:r>
+            <a:r>
+              <a:rPr lang="en-US" dirty="0" smtClean="0"/>
+              <a:t>SocketTest</a:t>
+            </a:r>
+            <a:endParaRPr lang="en-US" dirty="0">
+              <a:solidFill>
+                <a:srgbClr val="C00000"/>
+              </a:solidFill>
+            </a:endParaRPr>
+          </a:p>
+        </p:txBody>
+      </p:sp>
+    </p:spTree>
+    <p:extLst>
+      <p:ext uri="{BB962C8B-B14F-4D97-AF65-F5344CB8AC3E}">
+        <p14:creationId xmlns:p14="http://schemas.microsoft.com/office/powerpoint/2010/main" val="3715817680"/>
       </p:ext>
     </p:extLst>
   </p:cSld>

</xml_diff>